<commit_message>
incorporate comments from Chris, Nicolas
</commit_message>
<xml_diff>
--- a/specification/imgsrc/glyphs.pptx
+++ b/specification/imgsrc/glyphs.pptx
@@ -210,7 +210,7 @@
           <a:p>
             <a:fld id="{80E95D05-464A-6F4F-BC14-03954E32CC65}" type="datetimeFigureOut">
               <a:rPr lang="en-US" smtClean="0"/>
-              <a:t>11/27/17</a:t>
+              <a:t>11/28/17</a:t>
             </a:fld>
             <a:endParaRPr lang="en-US"/>
           </a:p>
@@ -659,7 +659,7 @@
           <a:p>
             <a:fld id="{B519623D-D8C4-D246-A1F7-180DFBDF806B}" type="datetimeFigureOut">
               <a:rPr lang="en-US" smtClean="0"/>
-              <a:t>11/27/17</a:t>
+              <a:t>11/28/17</a:t>
             </a:fld>
             <a:endParaRPr lang="en-US"/>
           </a:p>
@@ -829,7 +829,7 @@
           <a:p>
             <a:fld id="{B519623D-D8C4-D246-A1F7-180DFBDF806B}" type="datetimeFigureOut">
               <a:rPr lang="en-US" smtClean="0"/>
-              <a:t>11/27/17</a:t>
+              <a:t>11/28/17</a:t>
             </a:fld>
             <a:endParaRPr lang="en-US"/>
           </a:p>
@@ -1009,7 +1009,7 @@
           <a:p>
             <a:fld id="{B519623D-D8C4-D246-A1F7-180DFBDF806B}" type="datetimeFigureOut">
               <a:rPr lang="en-US" smtClean="0"/>
-              <a:t>11/27/17</a:t>
+              <a:t>11/28/17</a:t>
             </a:fld>
             <a:endParaRPr lang="en-US"/>
           </a:p>
@@ -1179,7 +1179,7 @@
           <a:p>
             <a:fld id="{B519623D-D8C4-D246-A1F7-180DFBDF806B}" type="datetimeFigureOut">
               <a:rPr lang="en-US" smtClean="0"/>
-              <a:t>11/27/17</a:t>
+              <a:t>11/28/17</a:t>
             </a:fld>
             <a:endParaRPr lang="en-US"/>
           </a:p>
@@ -1425,7 +1425,7 @@
           <a:p>
             <a:fld id="{B519623D-D8C4-D246-A1F7-180DFBDF806B}" type="datetimeFigureOut">
               <a:rPr lang="en-US" smtClean="0"/>
-              <a:t>11/27/17</a:t>
+              <a:t>11/28/17</a:t>
             </a:fld>
             <a:endParaRPr lang="en-US"/>
           </a:p>
@@ -1713,7 +1713,7 @@
           <a:p>
             <a:fld id="{B519623D-D8C4-D246-A1F7-180DFBDF806B}" type="datetimeFigureOut">
               <a:rPr lang="en-US" smtClean="0"/>
-              <a:t>11/27/17</a:t>
+              <a:t>11/28/17</a:t>
             </a:fld>
             <a:endParaRPr lang="en-US"/>
           </a:p>
@@ -2135,7 +2135,7 @@
           <a:p>
             <a:fld id="{B519623D-D8C4-D246-A1F7-180DFBDF806B}" type="datetimeFigureOut">
               <a:rPr lang="en-US" smtClean="0"/>
-              <a:t>11/27/17</a:t>
+              <a:t>11/28/17</a:t>
             </a:fld>
             <a:endParaRPr lang="en-US"/>
           </a:p>
@@ -2253,7 +2253,7 @@
           <a:p>
             <a:fld id="{B519623D-D8C4-D246-A1F7-180DFBDF806B}" type="datetimeFigureOut">
               <a:rPr lang="en-US" smtClean="0"/>
-              <a:t>11/27/17</a:t>
+              <a:t>11/28/17</a:t>
             </a:fld>
             <a:endParaRPr lang="en-US"/>
           </a:p>
@@ -2348,7 +2348,7 @@
           <a:p>
             <a:fld id="{B519623D-D8C4-D246-A1F7-180DFBDF806B}" type="datetimeFigureOut">
               <a:rPr lang="en-US" smtClean="0"/>
-              <a:t>11/27/17</a:t>
+              <a:t>11/28/17</a:t>
             </a:fld>
             <a:endParaRPr lang="en-US"/>
           </a:p>
@@ -2625,7 +2625,7 @@
           <a:p>
             <a:fld id="{B519623D-D8C4-D246-A1F7-180DFBDF806B}" type="datetimeFigureOut">
               <a:rPr lang="en-US" smtClean="0"/>
-              <a:t>11/27/17</a:t>
+              <a:t>11/28/17</a:t>
             </a:fld>
             <a:endParaRPr lang="en-US"/>
           </a:p>
@@ -2878,7 +2878,7 @@
           <a:p>
             <a:fld id="{B519623D-D8C4-D246-A1F7-180DFBDF806B}" type="datetimeFigureOut">
               <a:rPr lang="en-US" smtClean="0"/>
-              <a:t>11/27/17</a:t>
+              <a:t>11/28/17</a:t>
             </a:fld>
             <a:endParaRPr lang="en-US"/>
           </a:p>
@@ -3091,7 +3091,7 @@
           <a:p>
             <a:fld id="{B519623D-D8C4-D246-A1F7-180DFBDF806B}" type="datetimeFigureOut">
               <a:rPr lang="en-US" smtClean="0"/>
-              <a:t>11/27/17</a:t>
+              <a:t>11/28/17</a:t>
             </a:fld>
             <a:endParaRPr lang="en-US"/>
           </a:p>
@@ -3639,8 +3639,8 @@
           </p:nvSpPr>
           <p:spPr>
             <a:xfrm>
-              <a:off x="4457180" y="3409596"/>
-              <a:ext cx="1435393" cy="369332"/>
+              <a:off x="4806802" y="3409596"/>
+              <a:ext cx="610232" cy="369332"/>
             </a:xfrm>
             <a:prstGeom prst="rect">
               <a:avLst/>
@@ -3654,8 +3654,8 @@
             <a:lstStyle/>
             <a:p>
               <a:r>
-                <a:rPr lang="en-US" dirty="0" smtClean="0"/>
-                <a:t>SHOULD NOT</a:t>
+                <a:rPr lang="en-US" smtClean="0"/>
+                <a:t>MAY</a:t>
               </a:r>
               <a:endParaRPr lang="en-US" dirty="0"/>
             </a:p>

</xml_diff>